<commit_message>
added imports to Turning and Loops
</commit_message>
<xml_diff>
--- a/en/ProgrammingLessons/GyroTurningPy.pptx
+++ b/en/ProgrammingLessons/GyroTurningPy.pptx
@@ -223,7 +223,7 @@
           <a:p>
             <a:fld id="{58040048-1E4D-CD41-AC49-0750EB72586B}" type="datetimeFigureOut">
               <a:rPr lang="en-US" smtClean="0"/>
-              <a:t>11/8/2020</a:t>
+              <a:t>11/21/2020</a:t>
             </a:fld>
             <a:endParaRPr lang="en-US"/>
           </a:p>
@@ -389,7 +389,7 @@
           <a:p>
             <a:fld id="{2B8484CF-5098-F24E-8881-583515D5C406}" type="datetimeFigureOut">
               <a:rPr lang="en-US" smtClean="0"/>
-              <a:t>11/8/2020</a:t>
+              <a:t>11/21/2020</a:t>
             </a:fld>
             <a:endParaRPr lang="en-US"/>
           </a:p>
@@ -9650,7 +9650,7 @@
           <a:effectLst/>
           <a:extLst>
             <a:ext uri="{91240B29-F687-4f45-9708-019B960494DF}">
-              <a14:hiddenLine xmlns="" xmlns:a14="http://schemas.microsoft.com/office/drawing/2010/main" w="9525">
+              <a14:hiddenLine xmlns:a14="http://schemas.microsoft.com/office/drawing/2010/main" xmlns="" w="9525">
                 <a:solidFill>
                   <a:schemeClr val="tx1"/>
                 </a:solidFill>
@@ -9660,7 +9660,7 @@
               </a14:hiddenLine>
             </a:ext>
             <a:ext uri="{AF507438-7753-43e0-B8FC-AC1667EBCBE1}">
-              <a14:hiddenEffects xmlns="" xmlns:a14="http://schemas.microsoft.com/office/drawing/2010/main">
+              <a14:hiddenEffects xmlns:a14="http://schemas.microsoft.com/office/drawing/2010/main" xmlns="">
                 <a:effectLst>
                   <a:outerShdw dist="35921" dir="2700000" algn="ctr" rotWithShape="0">
                     <a:schemeClr val="bg2"/>
@@ -10001,7 +10001,7 @@
           <a:noFill/>
           <a:extLst>
             <a:ext uri="{909E8E84-426E-40dd-AFC4-6F175D3DCCD1}">
-              <a14:hiddenFill xmlns="" xmlns:a14="http://schemas.microsoft.com/office/drawing/2010/main">
+              <a14:hiddenFill xmlns:a14="http://schemas.microsoft.com/office/drawing/2010/main" xmlns="">
                 <a:solidFill>
                   <a:srgbClr val="FFFFFF"/>
                 </a:solidFill>
@@ -10388,6 +10388,88 @@
                 <a:latin typeface="Consolas" panose="020B0609020204030204" pitchFamily="49" charset="0"/>
               </a:rPr>
               <a:t>)</a:t>
+            </a:r>
+            <a:endParaRPr lang="en-US" dirty="0"/>
+          </a:p>
+          <a:p>
+            <a:r>
+              <a:rPr lang="en-US" sz="2000" dirty="0"/>
+              <a:t>In order to use the operator function, they must first be imported</a:t>
+            </a:r>
+          </a:p>
+          <a:p>
+            <a:pPr marL="0" indent="0">
+              <a:buNone/>
+            </a:pPr>
+            <a:r>
+              <a:rPr lang="en-GB" b="0" dirty="0">
+                <a:solidFill>
+                  <a:srgbClr val="0078CC"/>
+                </a:solidFill>
+                <a:effectLst/>
+                <a:latin typeface="Consolas" panose="020B0609020204030204" pitchFamily="49" charset="0"/>
+              </a:rPr>
+              <a:t>from</a:t>
+            </a:r>
+            <a:r>
+              <a:rPr lang="en-GB" b="0" dirty="0">
+                <a:solidFill>
+                  <a:srgbClr val="000000"/>
+                </a:solidFill>
+                <a:effectLst/>
+                <a:latin typeface="Consolas" panose="020B0609020204030204" pitchFamily="49" charset="0"/>
+              </a:rPr>
+              <a:t> </a:t>
+            </a:r>
+            <a:r>
+              <a:rPr lang="en-GB" b="0" dirty="0" err="1">
+                <a:solidFill>
+                  <a:srgbClr val="000000"/>
+                </a:solidFill>
+                <a:effectLst/>
+                <a:latin typeface="Consolas" panose="020B0609020204030204" pitchFamily="49" charset="0"/>
+              </a:rPr>
+              <a:t>spike.operator</a:t>
+            </a:r>
+            <a:r>
+              <a:rPr lang="en-GB" b="0" dirty="0">
+                <a:solidFill>
+                  <a:srgbClr val="000000"/>
+                </a:solidFill>
+                <a:effectLst/>
+                <a:latin typeface="Consolas" panose="020B0609020204030204" pitchFamily="49" charset="0"/>
+              </a:rPr>
+              <a:t> </a:t>
+            </a:r>
+            <a:r>
+              <a:rPr lang="en-GB" b="0" dirty="0">
+                <a:solidFill>
+                  <a:srgbClr val="0078CC"/>
+                </a:solidFill>
+                <a:effectLst/>
+                <a:latin typeface="Consolas" panose="020B0609020204030204" pitchFamily="49" charset="0"/>
+              </a:rPr>
+              <a:t>import</a:t>
+            </a:r>
+            <a:r>
+              <a:rPr lang="en-GB" b="0" dirty="0">
+                <a:solidFill>
+                  <a:srgbClr val="000000"/>
+                </a:solidFill>
+                <a:effectLst/>
+                <a:latin typeface="Consolas" panose="020B0609020204030204" pitchFamily="49" charset="0"/>
+              </a:rPr>
+              <a:t> </a:t>
+            </a:r>
+            <a:r>
+              <a:rPr lang="en-GB" b="0" dirty="0" err="1">
+                <a:solidFill>
+                  <a:srgbClr val="000000"/>
+                </a:solidFill>
+                <a:effectLst/>
+                <a:latin typeface="Consolas" panose="020B0609020204030204" pitchFamily="49" charset="0"/>
+              </a:rPr>
+              <a:t>greater_than_or_equal_to</a:t>
             </a:r>
             <a:endParaRPr lang="en-US" dirty="0"/>
           </a:p>
@@ -12098,6 +12180,20 @@
             <a:pPr lvl="1"/>
             <a:r>
               <a:rPr lang="en-US" dirty="0"/>
+              <a:t>Import operator function</a:t>
+            </a:r>
+          </a:p>
+          <a:p>
+            <a:pPr lvl="1"/>
+            <a:r>
+              <a:rPr lang="en-US" dirty="0"/>
+              <a:t>Configure Robot Movement</a:t>
+            </a:r>
+          </a:p>
+          <a:p>
+            <a:pPr lvl="1"/>
+            <a:r>
+              <a:rPr lang="en-US" dirty="0"/>
               <a:t>Make your robot start slowly turning right by just turning on the left wheel motor</a:t>
             </a:r>
           </a:p>
@@ -12117,18 +12213,10 @@
           </a:p>
           <a:p>
             <a:pPr lvl="1"/>
-            <a:endParaRPr lang="en-US" dirty="0"/>
-          </a:p>
-          <a:p>
-            <a:pPr lvl="1"/>
             <a:r>
               <a:rPr lang="en-US" dirty="0"/>
               <a:t>Wait until the gyro yaw angle has reached the degrees you want</a:t>
             </a:r>
-          </a:p>
-          <a:p>
-            <a:pPr lvl="1"/>
-            <a:endParaRPr lang="en-US" dirty="0"/>
           </a:p>
           <a:p>
             <a:pPr lvl="1"/>
@@ -12225,7 +12313,7 @@
         </p:nvSpPr>
         <p:spPr>
           <a:xfrm>
-            <a:off x="5251272" y="2273707"/>
+            <a:off x="5181077" y="2690336"/>
             <a:ext cx="3825763" cy="738664"/>
           </a:xfrm>
           <a:prstGeom prst="rect">
@@ -12450,7 +12538,7 @@
         </p:nvSpPr>
         <p:spPr>
           <a:xfrm>
-            <a:off x="4823749" y="3372801"/>
+            <a:off x="4641099" y="3925015"/>
             <a:ext cx="4098375" cy="338554"/>
           </a:xfrm>
           <a:prstGeom prst="rect">
@@ -12627,6 +12715,111 @@
           </a:p>
           <a:p>
             <a:endParaRPr lang="en-US" sz="1600" dirty="0"/>
+          </a:p>
+        </p:txBody>
+      </p:sp>
+      <p:sp>
+        <p:nvSpPr>
+          <p:cNvPr id="12" name="TextBox 11">
+            <a:extLst>
+              <a:ext uri="{FF2B5EF4-FFF2-40B4-BE49-F238E27FC236}">
+                <a16:creationId xmlns:a16="http://schemas.microsoft.com/office/drawing/2014/main" id="{6692AE85-6740-4DB8-9AF6-0C618E2D9927}"/>
+              </a:ext>
+            </a:extLst>
+          </p:cNvPr>
+          <p:cNvSpPr txBox="1"/>
+          <p:nvPr/>
+        </p:nvSpPr>
+        <p:spPr>
+          <a:xfrm>
+            <a:off x="3569934" y="2228600"/>
+            <a:ext cx="5352190" cy="307777"/>
+          </a:xfrm>
+          <a:prstGeom prst="rect">
+            <a:avLst/>
+          </a:prstGeom>
+          <a:noFill/>
+        </p:spPr>
+        <p:txBody>
+          <a:bodyPr wrap="square">
+            <a:spAutoFit/>
+          </a:bodyPr>
+          <a:lstStyle/>
+          <a:p>
+            <a:pPr marL="0" indent="0">
+              <a:buNone/>
+            </a:pPr>
+            <a:r>
+              <a:rPr lang="en-GB" sz="1400" b="0" dirty="0">
+                <a:solidFill>
+                  <a:srgbClr val="0078CC"/>
+                </a:solidFill>
+                <a:effectLst/>
+                <a:latin typeface="Consolas" panose="020B0609020204030204" pitchFamily="49" charset="0"/>
+              </a:rPr>
+              <a:t>from</a:t>
+            </a:r>
+            <a:r>
+              <a:rPr lang="en-GB" sz="1400" b="0" dirty="0">
+                <a:solidFill>
+                  <a:srgbClr val="000000"/>
+                </a:solidFill>
+                <a:effectLst/>
+                <a:latin typeface="Consolas" panose="020B0609020204030204" pitchFamily="49" charset="0"/>
+              </a:rPr>
+              <a:t> </a:t>
+            </a:r>
+            <a:r>
+              <a:rPr lang="en-GB" sz="1400" b="0" dirty="0" err="1">
+                <a:solidFill>
+                  <a:srgbClr val="000000"/>
+                </a:solidFill>
+                <a:effectLst/>
+                <a:latin typeface="Consolas" panose="020B0609020204030204" pitchFamily="49" charset="0"/>
+              </a:rPr>
+              <a:t>spike.operator</a:t>
+            </a:r>
+            <a:r>
+              <a:rPr lang="en-GB" sz="1400" b="0" dirty="0">
+                <a:solidFill>
+                  <a:srgbClr val="000000"/>
+                </a:solidFill>
+                <a:effectLst/>
+                <a:latin typeface="Consolas" panose="020B0609020204030204" pitchFamily="49" charset="0"/>
+              </a:rPr>
+              <a:t> </a:t>
+            </a:r>
+            <a:r>
+              <a:rPr lang="en-GB" sz="1400" b="0" dirty="0">
+                <a:solidFill>
+                  <a:srgbClr val="0078CC"/>
+                </a:solidFill>
+                <a:effectLst/>
+                <a:latin typeface="Consolas" panose="020B0609020204030204" pitchFamily="49" charset="0"/>
+              </a:rPr>
+              <a:t>import</a:t>
+            </a:r>
+            <a:r>
+              <a:rPr lang="en-GB" sz="1400" b="0" dirty="0">
+                <a:solidFill>
+                  <a:srgbClr val="000000"/>
+                </a:solidFill>
+                <a:effectLst/>
+                <a:latin typeface="Consolas" panose="020B0609020204030204" pitchFamily="49" charset="0"/>
+              </a:rPr>
+              <a:t> </a:t>
+            </a:r>
+            <a:r>
+              <a:rPr lang="en-GB" sz="1400" b="0" dirty="0" err="1">
+                <a:solidFill>
+                  <a:srgbClr val="000000"/>
+                </a:solidFill>
+                <a:effectLst/>
+                <a:latin typeface="Consolas" panose="020B0609020204030204" pitchFamily="49" charset="0"/>
+              </a:rPr>
+              <a:t>greater_than_or_equal_to</a:t>
+            </a:r>
+            <a:endParaRPr lang="en-US" sz="1400" dirty="0"/>
           </a:p>
         </p:txBody>
       </p:sp>
@@ -12777,7 +12970,7 @@
         <p:spPr>
           <a:xfrm>
             <a:off x="340182" y="2817687"/>
-            <a:ext cx="8463636" cy="1600438"/>
+            <a:ext cx="8463636" cy="1815882"/>
           </a:xfrm>
           <a:prstGeom prst="rect">
             <a:avLst/>
@@ -12789,6 +12982,85 @@
             <a:spAutoFit/>
           </a:bodyPr>
           <a:lstStyle/>
+          <a:p>
+            <a:r>
+              <a:rPr lang="en-GB" sz="1600" b="0" dirty="0">
+                <a:solidFill>
+                  <a:srgbClr val="0078CC"/>
+                </a:solidFill>
+                <a:effectLst/>
+                <a:latin typeface="Consolas" panose="020B0609020204030204" pitchFamily="49" charset="0"/>
+              </a:rPr>
+              <a:t>from</a:t>
+            </a:r>
+            <a:r>
+              <a:rPr lang="en-GB" sz="1600" b="0" dirty="0">
+                <a:solidFill>
+                  <a:srgbClr val="000000"/>
+                </a:solidFill>
+                <a:effectLst/>
+                <a:latin typeface="Consolas" panose="020B0609020204030204" pitchFamily="49" charset="0"/>
+              </a:rPr>
+              <a:t> </a:t>
+            </a:r>
+            <a:r>
+              <a:rPr lang="en-GB" sz="1600" b="0" dirty="0" err="1">
+                <a:solidFill>
+                  <a:srgbClr val="000000"/>
+                </a:solidFill>
+                <a:effectLst/>
+                <a:latin typeface="Consolas" panose="020B0609020204030204" pitchFamily="49" charset="0"/>
+              </a:rPr>
+              <a:t>spike.operator</a:t>
+            </a:r>
+            <a:r>
+              <a:rPr lang="en-GB" sz="1600" b="0" dirty="0">
+                <a:solidFill>
+                  <a:srgbClr val="000000"/>
+                </a:solidFill>
+                <a:effectLst/>
+                <a:latin typeface="Consolas" panose="020B0609020204030204" pitchFamily="49" charset="0"/>
+              </a:rPr>
+              <a:t> </a:t>
+            </a:r>
+            <a:r>
+              <a:rPr lang="en-GB" sz="1600" b="0" dirty="0">
+                <a:solidFill>
+                  <a:srgbClr val="0078CC"/>
+                </a:solidFill>
+                <a:effectLst/>
+                <a:latin typeface="Consolas" panose="020B0609020204030204" pitchFamily="49" charset="0"/>
+              </a:rPr>
+              <a:t>import</a:t>
+            </a:r>
+            <a:r>
+              <a:rPr lang="en-GB" sz="1600" b="0" dirty="0">
+                <a:solidFill>
+                  <a:srgbClr val="000000"/>
+                </a:solidFill>
+                <a:effectLst/>
+                <a:latin typeface="Consolas" panose="020B0609020204030204" pitchFamily="49" charset="0"/>
+              </a:rPr>
+              <a:t> </a:t>
+            </a:r>
+            <a:r>
+              <a:rPr lang="en-GB" sz="1600" b="0" dirty="0" err="1">
+                <a:solidFill>
+                  <a:srgbClr val="000000"/>
+                </a:solidFill>
+                <a:effectLst/>
+                <a:latin typeface="Consolas" panose="020B0609020204030204" pitchFamily="49" charset="0"/>
+              </a:rPr>
+              <a:t>greater_than_or_equal_to</a:t>
+            </a:r>
+            <a:endParaRPr lang="en-US" sz="1600" b="0" dirty="0">
+              <a:solidFill>
+                <a:srgbClr val="000000"/>
+              </a:solidFill>
+              <a:effectLst/>
+              <a:latin typeface="Consolas" panose="020B0609020204030204" pitchFamily="49" charset="0"/>
+            </a:endParaRPr>
+          </a:p>
           <a:p>
             <a:r>
               <a:rPr lang="en-US" sz="1600" b="0" dirty="0" err="1">
@@ -13271,7 +13543,7 @@
         </p:nvSpPr>
         <p:spPr>
           <a:xfrm>
-            <a:off x="155088" y="1140006"/>
+            <a:off x="155088" y="1102935"/>
             <a:ext cx="8851752" cy="1447877"/>
           </a:xfrm>
         </p:spPr>
@@ -13360,7 +13632,7 @@
         </p:nvSpPr>
         <p:spPr>
           <a:xfrm>
-            <a:off x="3967018" y="2518049"/>
+            <a:off x="3967018" y="2406836"/>
             <a:ext cx="1209963" cy="369332"/>
           </a:xfrm>
           <a:prstGeom prst="rect">
@@ -13396,7 +13668,7 @@
         </p:nvSpPr>
         <p:spPr>
           <a:xfrm>
-            <a:off x="3967017" y="4414583"/>
+            <a:off x="3967017" y="4303370"/>
             <a:ext cx="1209963" cy="369332"/>
           </a:xfrm>
           <a:prstGeom prst="rect">
@@ -13432,8 +13704,8 @@
         </p:nvSpPr>
         <p:spPr>
           <a:xfrm>
-            <a:off x="340181" y="2858194"/>
-            <a:ext cx="8463636" cy="1600438"/>
+            <a:off x="340181" y="2660482"/>
+            <a:ext cx="8463636" cy="1815882"/>
           </a:xfrm>
           <a:prstGeom prst="rect">
             <a:avLst/>
@@ -13445,6 +13717,85 @@
             <a:spAutoFit/>
           </a:bodyPr>
           <a:lstStyle/>
+          <a:p>
+            <a:r>
+              <a:rPr lang="en-GB" sz="1600" b="0" dirty="0">
+                <a:solidFill>
+                  <a:srgbClr val="0078CC"/>
+                </a:solidFill>
+                <a:effectLst/>
+                <a:latin typeface="Consolas" panose="020B0609020204030204" pitchFamily="49" charset="0"/>
+              </a:rPr>
+              <a:t>from</a:t>
+            </a:r>
+            <a:r>
+              <a:rPr lang="en-GB" sz="1600" b="0" dirty="0">
+                <a:solidFill>
+                  <a:srgbClr val="000000"/>
+                </a:solidFill>
+                <a:effectLst/>
+                <a:latin typeface="Consolas" panose="020B0609020204030204" pitchFamily="49" charset="0"/>
+              </a:rPr>
+              <a:t> </a:t>
+            </a:r>
+            <a:r>
+              <a:rPr lang="en-GB" sz="1600" b="0" dirty="0" err="1">
+                <a:solidFill>
+                  <a:srgbClr val="000000"/>
+                </a:solidFill>
+                <a:effectLst/>
+                <a:latin typeface="Consolas" panose="020B0609020204030204" pitchFamily="49" charset="0"/>
+              </a:rPr>
+              <a:t>spike.operator</a:t>
+            </a:r>
+            <a:r>
+              <a:rPr lang="en-GB" sz="1600" b="0" dirty="0">
+                <a:solidFill>
+                  <a:srgbClr val="000000"/>
+                </a:solidFill>
+                <a:effectLst/>
+                <a:latin typeface="Consolas" panose="020B0609020204030204" pitchFamily="49" charset="0"/>
+              </a:rPr>
+              <a:t> </a:t>
+            </a:r>
+            <a:r>
+              <a:rPr lang="en-GB" sz="1600" b="0" dirty="0">
+                <a:solidFill>
+                  <a:srgbClr val="0078CC"/>
+                </a:solidFill>
+                <a:effectLst/>
+                <a:latin typeface="Consolas" panose="020B0609020204030204" pitchFamily="49" charset="0"/>
+              </a:rPr>
+              <a:t>import</a:t>
+            </a:r>
+            <a:r>
+              <a:rPr lang="en-GB" sz="1600" b="0" dirty="0">
+                <a:solidFill>
+                  <a:srgbClr val="000000"/>
+                </a:solidFill>
+                <a:effectLst/>
+                <a:latin typeface="Consolas" panose="020B0609020204030204" pitchFamily="49" charset="0"/>
+              </a:rPr>
+              <a:t> </a:t>
+            </a:r>
+            <a:r>
+              <a:rPr lang="en-GB" sz="1600" b="0" dirty="0" err="1">
+                <a:solidFill>
+                  <a:srgbClr val="000000"/>
+                </a:solidFill>
+                <a:effectLst/>
+                <a:latin typeface="Consolas" panose="020B0609020204030204" pitchFamily="49" charset="0"/>
+              </a:rPr>
+              <a:t>greater_than_or_equal_to</a:t>
+            </a:r>
+            <a:endParaRPr lang="en-US" sz="1600" b="0" dirty="0">
+              <a:solidFill>
+                <a:srgbClr val="000000"/>
+              </a:solidFill>
+              <a:effectLst/>
+              <a:latin typeface="Consolas" panose="020B0609020204030204" pitchFamily="49" charset="0"/>
+            </a:endParaRPr>
+          </a:p>
           <a:p>
             <a:r>
               <a:rPr lang="en-US" sz="1600" b="0" dirty="0" err="1">
@@ -13802,8 +14153,8 @@
         </p:nvSpPr>
         <p:spPr>
           <a:xfrm>
-            <a:off x="349146" y="4729005"/>
-            <a:ext cx="8463636" cy="1600438"/>
+            <a:off x="349146" y="4531293"/>
+            <a:ext cx="8463636" cy="1815882"/>
           </a:xfrm>
           <a:prstGeom prst="rect">
             <a:avLst/>
@@ -13815,6 +14166,85 @@
             <a:spAutoFit/>
           </a:bodyPr>
           <a:lstStyle/>
+          <a:p>
+            <a:r>
+              <a:rPr lang="en-GB" sz="1600" b="0" dirty="0">
+                <a:solidFill>
+                  <a:srgbClr val="0078CC"/>
+                </a:solidFill>
+                <a:effectLst/>
+                <a:latin typeface="Consolas" panose="020B0609020204030204" pitchFamily="49" charset="0"/>
+              </a:rPr>
+              <a:t>from</a:t>
+            </a:r>
+            <a:r>
+              <a:rPr lang="en-GB" sz="1600" b="0" dirty="0">
+                <a:solidFill>
+                  <a:srgbClr val="000000"/>
+                </a:solidFill>
+                <a:effectLst/>
+                <a:latin typeface="Consolas" panose="020B0609020204030204" pitchFamily="49" charset="0"/>
+              </a:rPr>
+              <a:t> </a:t>
+            </a:r>
+            <a:r>
+              <a:rPr lang="en-GB" sz="1600" b="0" dirty="0" err="1">
+                <a:solidFill>
+                  <a:srgbClr val="000000"/>
+                </a:solidFill>
+                <a:effectLst/>
+                <a:latin typeface="Consolas" panose="020B0609020204030204" pitchFamily="49" charset="0"/>
+              </a:rPr>
+              <a:t>spike.operator</a:t>
+            </a:r>
+            <a:r>
+              <a:rPr lang="en-GB" sz="1600" b="0" dirty="0">
+                <a:solidFill>
+                  <a:srgbClr val="000000"/>
+                </a:solidFill>
+                <a:effectLst/>
+                <a:latin typeface="Consolas" panose="020B0609020204030204" pitchFamily="49" charset="0"/>
+              </a:rPr>
+              <a:t> </a:t>
+            </a:r>
+            <a:r>
+              <a:rPr lang="en-GB" sz="1600" b="0" dirty="0">
+                <a:solidFill>
+                  <a:srgbClr val="0078CC"/>
+                </a:solidFill>
+                <a:effectLst/>
+                <a:latin typeface="Consolas" panose="020B0609020204030204" pitchFamily="49" charset="0"/>
+              </a:rPr>
+              <a:t>import</a:t>
+            </a:r>
+            <a:r>
+              <a:rPr lang="en-GB" sz="1600" b="0" dirty="0">
+                <a:solidFill>
+                  <a:srgbClr val="000000"/>
+                </a:solidFill>
+                <a:effectLst/>
+                <a:latin typeface="Consolas" panose="020B0609020204030204" pitchFamily="49" charset="0"/>
+              </a:rPr>
+              <a:t> </a:t>
+            </a:r>
+            <a:r>
+              <a:rPr lang="en-GB" sz="1600" b="0" dirty="0" err="1">
+                <a:solidFill>
+                  <a:srgbClr val="000000"/>
+                </a:solidFill>
+                <a:effectLst/>
+                <a:latin typeface="Consolas" panose="020B0609020204030204" pitchFamily="49" charset="0"/>
+              </a:rPr>
+              <a:t>greater_than_or_equal_to</a:t>
+            </a:r>
+            <a:endParaRPr lang="en-US" sz="1600" b="0" dirty="0">
+              <a:solidFill>
+                <a:srgbClr val="000000"/>
+              </a:solidFill>
+              <a:effectLst/>
+              <a:latin typeface="Consolas" panose="020B0609020204030204" pitchFamily="49" charset="0"/>
+            </a:endParaRPr>
+          </a:p>
           <a:p>
             <a:r>
               <a:rPr lang="en-US" sz="1600" b="0" dirty="0" err="1">
@@ -14172,7 +14602,7 @@
         </p:nvSpPr>
         <p:spPr>
           <a:xfrm>
-            <a:off x="2752201" y="3383409"/>
+            <a:off x="2752201" y="3432836"/>
             <a:ext cx="815913" cy="302167"/>
           </a:xfrm>
           <a:prstGeom prst="rect">
@@ -14224,7 +14654,7 @@
         </p:nvSpPr>
         <p:spPr>
           <a:xfrm>
-            <a:off x="2752201" y="5227057"/>
+            <a:off x="2752201" y="5276484"/>
             <a:ext cx="815913" cy="302167"/>
           </a:xfrm>
           <a:prstGeom prst="rect">
@@ -14276,7 +14706,7 @@
         </p:nvSpPr>
         <p:spPr>
           <a:xfrm>
-            <a:off x="5269615" y="3888406"/>
+            <a:off x="5269615" y="3937833"/>
             <a:ext cx="3285910" cy="278636"/>
           </a:xfrm>
           <a:prstGeom prst="rect">
@@ -14332,7 +14762,7 @@
         </p:nvSpPr>
         <p:spPr>
           <a:xfrm>
-            <a:off x="5269615" y="5746406"/>
+            <a:off x="5269615" y="5795833"/>
             <a:ext cx="3104840" cy="278636"/>
           </a:xfrm>
           <a:prstGeom prst="rect">

</xml_diff>